<commit_message>
Corrected a few things in the docker-compose slides
</commit_message>
<xml_diff>
--- a/DOCKER Commands and Notes.pptx
+++ b/DOCKER Commands and Notes.pptx
@@ -256,7 +256,7 @@
           <a:p>
             <a:fld id="{8ECA3D97-5CBC-4329-962A-77B331FD9F3D}" type="datetimeFigureOut">
               <a:rPr lang="en-US" smtClean="0"/>
-              <a:t>2021-01-15</a:t>
+              <a:t>2021-01-16</a:t>
             </a:fld>
             <a:endParaRPr lang="en-US"/>
           </a:p>
@@ -655,7 +655,7 @@
           <a:p>
             <a:fld id="{505F40C9-9084-4503-A57D-41B5C11783C8}" type="datetimeFigureOut">
               <a:rPr lang="en-US" smtClean="0"/>
-              <a:t>2021-01-15</a:t>
+              <a:t>2021-01-16</a:t>
             </a:fld>
             <a:endParaRPr lang="en-US"/>
           </a:p>
@@ -825,7 +825,7 @@
           <a:p>
             <a:fld id="{505F40C9-9084-4503-A57D-41B5C11783C8}" type="datetimeFigureOut">
               <a:rPr lang="en-US" smtClean="0"/>
-              <a:t>2021-01-15</a:t>
+              <a:t>2021-01-16</a:t>
             </a:fld>
             <a:endParaRPr lang="en-US"/>
           </a:p>
@@ -1005,7 +1005,7 @@
           <a:p>
             <a:fld id="{505F40C9-9084-4503-A57D-41B5C11783C8}" type="datetimeFigureOut">
               <a:rPr lang="en-US" smtClean="0"/>
-              <a:t>2021-01-15</a:t>
+              <a:t>2021-01-16</a:t>
             </a:fld>
             <a:endParaRPr lang="en-US"/>
           </a:p>
@@ -1175,7 +1175,7 @@
           <a:p>
             <a:fld id="{505F40C9-9084-4503-A57D-41B5C11783C8}" type="datetimeFigureOut">
               <a:rPr lang="en-US" smtClean="0"/>
-              <a:t>2021-01-15</a:t>
+              <a:t>2021-01-16</a:t>
             </a:fld>
             <a:endParaRPr lang="en-US"/>
           </a:p>
@@ -1421,7 +1421,7 @@
           <a:p>
             <a:fld id="{505F40C9-9084-4503-A57D-41B5C11783C8}" type="datetimeFigureOut">
               <a:rPr lang="en-US" smtClean="0"/>
-              <a:t>2021-01-15</a:t>
+              <a:t>2021-01-16</a:t>
             </a:fld>
             <a:endParaRPr lang="en-US"/>
           </a:p>
@@ -1653,7 +1653,7 @@
           <a:p>
             <a:fld id="{505F40C9-9084-4503-A57D-41B5C11783C8}" type="datetimeFigureOut">
               <a:rPr lang="en-US" smtClean="0"/>
-              <a:t>2021-01-15</a:t>
+              <a:t>2021-01-16</a:t>
             </a:fld>
             <a:endParaRPr lang="en-US"/>
           </a:p>
@@ -2020,7 +2020,7 @@
           <a:p>
             <a:fld id="{505F40C9-9084-4503-A57D-41B5C11783C8}" type="datetimeFigureOut">
               <a:rPr lang="en-US" smtClean="0"/>
-              <a:t>2021-01-15</a:t>
+              <a:t>2021-01-16</a:t>
             </a:fld>
             <a:endParaRPr lang="en-US"/>
           </a:p>
@@ -2138,7 +2138,7 @@
           <a:p>
             <a:fld id="{505F40C9-9084-4503-A57D-41B5C11783C8}" type="datetimeFigureOut">
               <a:rPr lang="en-US" smtClean="0"/>
-              <a:t>2021-01-15</a:t>
+              <a:t>2021-01-16</a:t>
             </a:fld>
             <a:endParaRPr lang="en-US"/>
           </a:p>
@@ -2233,7 +2233,7 @@
           <a:p>
             <a:fld id="{505F40C9-9084-4503-A57D-41B5C11783C8}" type="datetimeFigureOut">
               <a:rPr lang="en-US" smtClean="0"/>
-              <a:t>2021-01-15</a:t>
+              <a:t>2021-01-16</a:t>
             </a:fld>
             <a:endParaRPr lang="en-US"/>
           </a:p>
@@ -2510,7 +2510,7 @@
           <a:p>
             <a:fld id="{505F40C9-9084-4503-A57D-41B5C11783C8}" type="datetimeFigureOut">
               <a:rPr lang="en-US" smtClean="0"/>
-              <a:t>2021-01-15</a:t>
+              <a:t>2021-01-16</a:t>
             </a:fld>
             <a:endParaRPr lang="en-US"/>
           </a:p>
@@ -2763,7 +2763,7 @@
           <a:p>
             <a:fld id="{505F40C9-9084-4503-A57D-41B5C11783C8}" type="datetimeFigureOut">
               <a:rPr lang="en-US" smtClean="0"/>
-              <a:t>2021-01-15</a:t>
+              <a:t>2021-01-16</a:t>
             </a:fld>
             <a:endParaRPr lang="en-US"/>
           </a:p>
@@ -2976,7 +2976,7 @@
           <a:p>
             <a:fld id="{505F40C9-9084-4503-A57D-41B5C11783C8}" type="datetimeFigureOut">
               <a:rPr lang="en-US" smtClean="0"/>
-              <a:t>2021-01-15</a:t>
+              <a:t>2021-01-16</a:t>
             </a:fld>
             <a:endParaRPr lang="en-US"/>
           </a:p>
@@ -5907,21 +5907,7 @@
                 <a:latin typeface="Adobe Devanagari" panose="02040503050201020203" pitchFamily="18" charset="0"/>
                 <a:cs typeface="Adobe Devanagari" panose="02040503050201020203" pitchFamily="18" charset="0"/>
               </a:rPr>
-              <a:t> can be followed by a </a:t>
-            </a:r>
-            <a:r>
-              <a:rPr lang="en-US" sz="2400" smtClean="0">
-                <a:latin typeface="Adobe Devanagari" panose="02040503050201020203" pitchFamily="18" charset="0"/>
-                <a:cs typeface="Adobe Devanagari" panose="02040503050201020203" pitchFamily="18" charset="0"/>
-              </a:rPr>
-              <a:t>command </a:t>
-            </a:r>
-            <a:r>
-              <a:rPr lang="en-US" sz="2400" smtClean="0">
-                <a:latin typeface="Adobe Devanagari" panose="02040503050201020203" pitchFamily="18" charset="0"/>
-                <a:cs typeface="Adobe Devanagari" panose="02040503050201020203" pitchFamily="18" charset="0"/>
-              </a:rPr>
-              <a:t>to execute when the container is created</a:t>
+              <a:t> can be followed by a command to execute when the container is created</a:t>
             </a:r>
           </a:p>
           <a:p>
@@ -13683,15 +13669,6 @@
               </a:rPr>
               <a:t>LINKING</a:t>
             </a:r>
-            <a:endParaRPr lang="en-US" sz="7200" b="1" smtClean="0">
-              <a:solidFill>
-                <a:schemeClr val="accent5">
-                  <a:lumMod val="60000"/>
-                  <a:lumOff val="40000"/>
-                </a:schemeClr>
-              </a:solidFill>
-              <a:latin typeface="SF Movie Poster" panose="00000400000000000000" pitchFamily="2" charset="0"/>
-            </a:endParaRPr>
           </a:p>
           <a:p>
             <a:pPr algn="ctr"/>
@@ -14195,15 +14172,6 @@
               </a:rPr>
               <a:t>DOCKER-COMPOSE</a:t>
             </a:r>
-            <a:endParaRPr lang="en-US" sz="7200" b="1" smtClean="0">
-              <a:solidFill>
-                <a:schemeClr val="accent5">
-                  <a:lumMod val="60000"/>
-                  <a:lumOff val="40000"/>
-                </a:schemeClr>
-              </a:solidFill>
-              <a:latin typeface="SF Movie Poster" panose="00000400000000000000" pitchFamily="2" charset="0"/>
-            </a:endParaRPr>
           </a:p>
           <a:p>
             <a:pPr algn="ctr"/>
@@ -14450,14 +14418,14 @@
                 <a:latin typeface="Adobe Devanagari" panose="02040503050201020203" pitchFamily="18" charset="0"/>
                 <a:cs typeface="Adobe Devanagari" panose="02040503050201020203" pitchFamily="18" charset="0"/>
               </a:rPr>
-              <a:t>be used to run various containers and make connections between </a:t>
+              <a:t>can be </a:t>
             </a:r>
             <a:r>
               <a:rPr lang="en-US" sz="2400" smtClean="0">
                 <a:latin typeface="Adobe Devanagari" panose="02040503050201020203" pitchFamily="18" charset="0"/>
                 <a:cs typeface="Adobe Devanagari" panose="02040503050201020203" pitchFamily="18" charset="0"/>
               </a:rPr>
-              <a:t>them</a:t>
+              <a:t>used to run various containers and make connections between them</a:t>
             </a:r>
           </a:p>
           <a:p>
@@ -14547,28 +14515,24 @@
                 <a:latin typeface="Adobe Devanagari" panose="02040503050201020203" pitchFamily="18" charset="0"/>
                 <a:cs typeface="Adobe Devanagari" panose="02040503050201020203" pitchFamily="18" charset="0"/>
               </a:rPr>
-              <a:t>docker compose up</a:t>
+              <a:t>docker-compose </a:t>
             </a:r>
             <a:r>
               <a:rPr lang="es-ES" sz="2400" smtClean="0">
-                <a:latin typeface="Adobe Devanagari" panose="02040503050201020203" pitchFamily="18" charset="0"/>
-                <a:cs typeface="Adobe Devanagari" panose="02040503050201020203" pitchFamily="18" charset="0"/>
-              </a:rPr>
-              <a:t>” </a:t>
+                <a:solidFill>
+                  <a:schemeClr val="accent1"/>
+                </a:solidFill>
+                <a:latin typeface="Adobe Devanagari" panose="02040503050201020203" pitchFamily="18" charset="0"/>
+                <a:cs typeface="Adobe Devanagari" panose="02040503050201020203" pitchFamily="18" charset="0"/>
+              </a:rPr>
+              <a:t>up</a:t>
             </a:r>
             <a:r>
               <a:rPr lang="es-ES" sz="2400" smtClean="0">
                 <a:latin typeface="Adobe Devanagari" panose="02040503050201020203" pitchFamily="18" charset="0"/>
                 <a:cs typeface="Adobe Devanagari" panose="02040503050201020203" pitchFamily="18" charset="0"/>
               </a:rPr>
-              <a:t>in the directory where that </a:t>
-            </a:r>
-            <a:r>
-              <a:rPr lang="es-ES" sz="2400" smtClean="0">
-                <a:latin typeface="Adobe Devanagari" panose="02040503050201020203" pitchFamily="18" charset="0"/>
-                <a:cs typeface="Adobe Devanagari" panose="02040503050201020203" pitchFamily="18" charset="0"/>
-              </a:rPr>
-              <a:t>file </a:t>
+              <a:t>” in the directory where that file </a:t>
             </a:r>
             <a:r>
               <a:rPr lang="es-ES" sz="2400" smtClean="0">
@@ -14607,30 +14571,93 @@
               </a:lnSpc>
             </a:pPr>
             <a:r>
+              <a:rPr lang="es-ES" sz="2400" smtClean="0">
+                <a:latin typeface="Adobe Devanagari" panose="02040503050201020203" pitchFamily="18" charset="0"/>
+                <a:cs typeface="Adobe Devanagari" panose="02040503050201020203" pitchFamily="18" charset="0"/>
+              </a:rPr>
+              <a:t>Note: running the command “</a:t>
+            </a:r>
+            <a:r>
               <a:rPr lang="es-ES" sz="2400">
-                <a:latin typeface="Adobe Devanagari" panose="02040503050201020203" pitchFamily="18" charset="0"/>
-                <a:cs typeface="Adobe Devanagari" panose="02040503050201020203" pitchFamily="18" charset="0"/>
-              </a:rPr>
-              <a:t>To see an example of how to create a docker-compose.yml file, </a:t>
-            </a:r>
-            <a:r>
-              <a:rPr lang="es-ES" sz="2400">
-                <a:latin typeface="Adobe Devanagari" panose="02040503050201020203" pitchFamily="18" charset="0"/>
-                <a:cs typeface="Adobe Devanagari" panose="02040503050201020203" pitchFamily="18" charset="0"/>
-              </a:rPr>
-              <a:t>see </a:t>
+                <a:solidFill>
+                  <a:schemeClr val="accent1"/>
+                </a:solidFill>
+                <a:latin typeface="Adobe Devanagari" panose="02040503050201020203" pitchFamily="18" charset="0"/>
+                <a:cs typeface="Adobe Devanagari" panose="02040503050201020203" pitchFamily="18" charset="0"/>
+              </a:rPr>
+              <a:t>docker-compose down</a:t>
             </a:r>
             <a:r>
               <a:rPr lang="es-ES" sz="2400" smtClean="0">
                 <a:latin typeface="Adobe Devanagari" panose="02040503050201020203" pitchFamily="18" charset="0"/>
                 <a:cs typeface="Adobe Devanagari" panose="02040503050201020203" pitchFamily="18" charset="0"/>
               </a:rPr>
-              <a:t>a few pages forward:</a:t>
-            </a:r>
-            <a:endParaRPr lang="en-US" sz="2400">
+              <a:t>” will remove all containers and delete all images</a:t>
+            </a:r>
+            <a:endParaRPr lang="es-ES" sz="2400" smtClean="0">
               <a:latin typeface="Adobe Devanagari" panose="02040503050201020203" pitchFamily="18" charset="0"/>
               <a:cs typeface="Adobe Devanagari" panose="02040503050201020203" pitchFamily="18" charset="0"/>
             </a:endParaRPr>
+          </a:p>
+        </p:txBody>
+      </p:sp>
+      <p:sp>
+        <p:nvSpPr>
+          <p:cNvPr id="2" name="TextBox 1"/>
+          <p:cNvSpPr txBox="1"/>
+          <p:nvPr/>
+        </p:nvSpPr>
+        <p:spPr>
+          <a:xfrm rot="20612183">
+            <a:off x="7386155" y="5242560"/>
+            <a:ext cx="4852995" cy="369332"/>
+          </a:xfrm>
+          <a:prstGeom prst="rect">
+            <a:avLst/>
+          </a:prstGeom>
+          <a:noFill/>
+        </p:spPr>
+        <p:txBody>
+          <a:bodyPr wrap="none" rtlCol="0">
+            <a:spAutoFit/>
+          </a:bodyPr>
+          <a:lstStyle/>
+          <a:p>
+            <a:r>
+              <a:rPr lang="es-ES" smtClean="0"/>
+              <a:t>* Example of a docker compose file in a few slides</a:t>
+            </a:r>
+            <a:endParaRPr lang="en-US"/>
+          </a:p>
+        </p:txBody>
+      </p:sp>
+      <p:sp>
+        <p:nvSpPr>
+          <p:cNvPr id="6" name="TextBox 5"/>
+          <p:cNvSpPr txBox="1"/>
+          <p:nvPr/>
+        </p:nvSpPr>
+        <p:spPr>
+          <a:xfrm>
+            <a:off x="4665612" y="2633529"/>
+            <a:ext cx="3043654" cy="369332"/>
+          </a:xfrm>
+          <a:prstGeom prst="rect">
+            <a:avLst/>
+          </a:prstGeom>
+          <a:noFill/>
+        </p:spPr>
+        <p:txBody>
+          <a:bodyPr wrap="none" rtlCol="0">
+            <a:spAutoFit/>
+          </a:bodyPr>
+          <a:lstStyle/>
+          <a:p>
+            <a:r>
+              <a:rPr lang="es-ES" smtClean="0"/>
+              <a:t>(and pull all necessary images)</a:t>
+            </a:r>
+            <a:endParaRPr lang="en-US"/>
           </a:p>
         </p:txBody>
       </p:sp>
@@ -14858,6 +14885,16 @@
               <a:t>It will just automatically execute that file when running the command “</a:t>
             </a:r>
             <a:r>
+              <a:rPr lang="es-ES" sz="2400" smtClean="0">
+                <a:solidFill>
+                  <a:schemeClr val="accent1"/>
+                </a:solidFill>
+                <a:latin typeface="Adobe Devanagari" panose="02040503050201020203" pitchFamily="18" charset="0"/>
+                <a:cs typeface="Adobe Devanagari" panose="02040503050201020203" pitchFamily="18" charset="0"/>
+              </a:rPr>
+              <a:t>docker-compose </a:t>
+            </a:r>
+            <a:r>
               <a:rPr lang="es-ES" sz="2400">
                 <a:solidFill>
                   <a:schemeClr val="accent1"/>
@@ -14865,7 +14902,7 @@
                 <a:latin typeface="Adobe Devanagari" panose="02040503050201020203" pitchFamily="18" charset="0"/>
                 <a:cs typeface="Adobe Devanagari" panose="02040503050201020203" pitchFamily="18" charset="0"/>
               </a:rPr>
-              <a:t>docker compose up</a:t>
+              <a:t>up</a:t>
             </a:r>
             <a:r>
               <a:rPr lang="es-ES" sz="2400" smtClean="0">
@@ -15080,7 +15117,7 @@
         <p:spPr>
           <a:xfrm>
             <a:off x="0" y="1690690"/>
-            <a:ext cx="12191999" cy="4524315"/>
+            <a:ext cx="12191999" cy="5078313"/>
           </a:xfrm>
           <a:prstGeom prst="rect">
             <a:avLst/>
@@ -15173,7 +15210,21 @@
                 <a:latin typeface="Adobe Devanagari" panose="02040503050201020203" pitchFamily="18" charset="0"/>
                 <a:cs typeface="Adobe Devanagari" panose="02040503050201020203" pitchFamily="18" charset="0"/>
               </a:rPr>
-              <a:t>After that, we can play around with the containers in the same way as docker but with docker-compose</a:t>
+              <a:t>After that, we can play around with </a:t>
+            </a:r>
+            <a:r>
+              <a:rPr lang="es-ES" sz="2400" smtClean="0">
+                <a:latin typeface="Adobe Devanagari" panose="02040503050201020203" pitchFamily="18" charset="0"/>
+                <a:cs typeface="Adobe Devanagari" panose="02040503050201020203" pitchFamily="18" charset="0"/>
+              </a:rPr>
+              <a:t>all the </a:t>
+            </a:r>
+            <a:r>
+              <a:rPr lang="es-ES" sz="2400" smtClean="0">
+                <a:latin typeface="Adobe Devanagari" panose="02040503050201020203" pitchFamily="18" charset="0"/>
+                <a:cs typeface="Adobe Devanagari" panose="02040503050201020203" pitchFamily="18" charset="0"/>
+              </a:rPr>
+              <a:t>containers in the same way as docker but with docker-compose</a:t>
             </a:r>
           </a:p>
           <a:p>
@@ -15241,7 +15292,14 @@
                 <a:latin typeface="Adobe Devanagari" panose="02040503050201020203" pitchFamily="18" charset="0"/>
                 <a:cs typeface="Adobe Devanagari" panose="02040503050201020203" pitchFamily="18" charset="0"/>
               </a:rPr>
-              <a:t>EXAMPLE 1: </a:t>
+              <a:t>EXAMPLE </a:t>
+            </a:r>
+            <a:r>
+              <a:rPr lang="es-ES" sz="2400" smtClean="0">
+                <a:latin typeface="Adobe Devanagari" panose="02040503050201020203" pitchFamily="18" charset="0"/>
+                <a:cs typeface="Adobe Devanagari" panose="02040503050201020203" pitchFamily="18" charset="0"/>
+              </a:rPr>
+              <a:t>2: </a:t>
             </a:r>
             <a:r>
               <a:rPr lang="es-ES" sz="2400">
@@ -15251,7 +15309,67 @@
                 <a:latin typeface="Adobe Devanagari" panose="02040503050201020203" pitchFamily="18" charset="0"/>
                 <a:cs typeface="Adobe Devanagari" panose="02040503050201020203" pitchFamily="18" charset="0"/>
               </a:rPr>
-              <a:t>docker-compose </a:t>
+              <a:t>docker-compose start</a:t>
+            </a:r>
+            <a:r>
+              <a:rPr lang="es-ES" sz="2400">
+                <a:latin typeface="Adobe Devanagari" panose="02040503050201020203" pitchFamily="18" charset="0"/>
+                <a:cs typeface="Adobe Devanagari" panose="02040503050201020203" pitchFamily="18" charset="0"/>
+              </a:rPr>
+              <a:t>	</a:t>
+            </a:r>
+            <a:r>
+              <a:rPr lang="es-ES" sz="2400">
+                <a:latin typeface="Adobe Devanagari" panose="02040503050201020203" pitchFamily="18" charset="0"/>
+                <a:cs typeface="Adobe Devanagari" panose="02040503050201020203" pitchFamily="18" charset="0"/>
+                <a:sym typeface="Wingdings" panose="05000000000000000000" pitchFamily="2" charset="2"/>
+              </a:rPr>
+              <a:t> </a:t>
+            </a:r>
+            <a:r>
+              <a:rPr lang="es-ES" sz="2400" smtClean="0">
+                <a:latin typeface="Adobe Devanagari" panose="02040503050201020203" pitchFamily="18" charset="0"/>
+                <a:cs typeface="Adobe Devanagari" panose="02040503050201020203" pitchFamily="18" charset="0"/>
+                <a:sym typeface="Wingdings" panose="05000000000000000000" pitchFamily="2" charset="2"/>
+              </a:rPr>
+              <a:t>starts </a:t>
+            </a:r>
+            <a:r>
+              <a:rPr lang="es-ES" sz="2400">
+                <a:latin typeface="Adobe Devanagari" panose="02040503050201020203" pitchFamily="18" charset="0"/>
+                <a:cs typeface="Adobe Devanagari" panose="02040503050201020203" pitchFamily="18" charset="0"/>
+                <a:sym typeface="Wingdings" panose="05000000000000000000" pitchFamily="2" charset="2"/>
+              </a:rPr>
+              <a:t>all containers from the </a:t>
+            </a:r>
+            <a:r>
+              <a:rPr lang="es-ES" sz="2400" smtClean="0">
+                <a:latin typeface="Adobe Devanagari" panose="02040503050201020203" pitchFamily="18" charset="0"/>
+                <a:cs typeface="Adobe Devanagari" panose="02040503050201020203" pitchFamily="18" charset="0"/>
+                <a:sym typeface="Wingdings" panose="05000000000000000000" pitchFamily="2" charset="2"/>
+              </a:rPr>
+              <a:t>docker-compose</a:t>
+            </a:r>
+          </a:p>
+          <a:p>
+            <a:pPr algn="ctr">
+              <a:lnSpc>
+                <a:spcPct val="150000"/>
+              </a:lnSpc>
+            </a:pPr>
+            <a:r>
+              <a:rPr lang="es-ES" sz="2400">
+                <a:latin typeface="Adobe Devanagari" panose="02040503050201020203" pitchFamily="18" charset="0"/>
+                <a:cs typeface="Adobe Devanagari" panose="02040503050201020203" pitchFamily="18" charset="0"/>
+              </a:rPr>
+              <a:t>EXAMPLE </a:t>
+            </a:r>
+            <a:r>
+              <a:rPr lang="es-ES" sz="2400" smtClean="0">
+                <a:latin typeface="Adobe Devanagari" panose="02040503050201020203" pitchFamily="18" charset="0"/>
+                <a:cs typeface="Adobe Devanagari" panose="02040503050201020203" pitchFamily="18" charset="0"/>
+              </a:rPr>
+              <a:t>3: </a:t>
             </a:r>
             <a:r>
               <a:rPr lang="es-ES" sz="2400">
@@ -15261,7 +15379,17 @@
                 <a:latin typeface="Adobe Devanagari" panose="02040503050201020203" pitchFamily="18" charset="0"/>
                 <a:cs typeface="Adobe Devanagari" panose="02040503050201020203" pitchFamily="18" charset="0"/>
               </a:rPr>
-              <a:t>start</a:t>
+              <a:t>docker-compose </a:t>
+            </a:r>
+            <a:r>
+              <a:rPr lang="es-ES" sz="2400" smtClean="0">
+                <a:solidFill>
+                  <a:schemeClr val="accent1"/>
+                </a:solidFill>
+                <a:latin typeface="Adobe Devanagari" panose="02040503050201020203" pitchFamily="18" charset="0"/>
+                <a:cs typeface="Adobe Devanagari" panose="02040503050201020203" pitchFamily="18" charset="0"/>
+              </a:rPr>
+              <a:t>rm</a:t>
             </a:r>
             <a:r>
               <a:rPr lang="es-ES" sz="2400">
@@ -15284,7 +15412,7 @@
                 <a:cs typeface="Adobe Devanagari" panose="02040503050201020203" pitchFamily="18" charset="0"/>
                 <a:sym typeface="Wingdings" panose="05000000000000000000" pitchFamily="2" charset="2"/>
               </a:rPr>
-              <a:t>starts </a:t>
+              <a:t>removes all </a:t>
             </a:r>
             <a:r>
               <a:rPr lang="es-ES" sz="2400">
@@ -15292,15 +15420,7 @@
                 <a:cs typeface="Adobe Devanagari" panose="02040503050201020203" pitchFamily="18" charset="0"/>
                 <a:sym typeface="Wingdings" panose="05000000000000000000" pitchFamily="2" charset="2"/>
               </a:rPr>
-              <a:t>all containers from </a:t>
-            </a:r>
-            <a:r>
-              <a:rPr lang="es-ES" sz="2400">
-                <a:latin typeface="Adobe Devanagari" panose="02040503050201020203" pitchFamily="18" charset="0"/>
-                <a:cs typeface="Adobe Devanagari" panose="02040503050201020203" pitchFamily="18" charset="0"/>
-                <a:sym typeface="Wingdings" panose="05000000000000000000" pitchFamily="2" charset="2"/>
-              </a:rPr>
-              <a:t>the </a:t>
+              <a:t>containers from the </a:t>
             </a:r>
             <a:r>
               <a:rPr lang="es-ES" sz="2400" smtClean="0">
@@ -15444,9 +15564,57 @@
           </a:p>
         </p:txBody>
       </p:sp>
+      <p:sp>
+        <p:nvSpPr>
+          <p:cNvPr id="5" name="TextBox 4"/>
+          <p:cNvSpPr txBox="1"/>
+          <p:nvPr/>
+        </p:nvSpPr>
+        <p:spPr>
+          <a:xfrm>
+            <a:off x="9143999" y="3047998"/>
+            <a:ext cx="2743201" cy="2585323"/>
+          </a:xfrm>
+          <a:prstGeom prst="rect">
+            <a:avLst/>
+          </a:prstGeom>
+          <a:noFill/>
+        </p:spPr>
+        <p:txBody>
+          <a:bodyPr wrap="square" rtlCol="0">
+            <a:spAutoFit/>
+          </a:bodyPr>
+          <a:lstStyle/>
+          <a:p>
+            <a:r>
+              <a:rPr lang="es-ES" smtClean="0"/>
+              <a:t>This is an example of a docker compose file.</a:t>
+            </a:r>
+          </a:p>
+          <a:p>
+            <a:endParaRPr lang="es-ES"/>
+          </a:p>
+          <a:p>
+            <a:r>
+              <a:rPr lang="es-ES" smtClean="0"/>
+              <a:t>In the right we see the docker compose file.</a:t>
+            </a:r>
+          </a:p>
+          <a:p>
+            <a:endParaRPr lang="es-ES"/>
+          </a:p>
+          <a:p>
+            <a:r>
+              <a:rPr lang="es-ES" smtClean="0"/>
+              <a:t>In the left, the equivalent sequence of docker commands.</a:t>
+            </a:r>
+            <a:endParaRPr lang="en-US"/>
+          </a:p>
+        </p:txBody>
+      </p:sp>
       <p:pic>
         <p:nvPicPr>
-          <p:cNvPr id="6" name="Picture 5"/>
+          <p:cNvPr id="8" name="Picture 7"/>
           <p:cNvPicPr>
             <a:picLocks noChangeAspect="1"/>
           </p:cNvPicPr>
@@ -15460,8 +15628,8 @@
         </p:blipFill>
         <p:spPr>
           <a:xfrm>
-            <a:off x="2177143" y="2033674"/>
-            <a:ext cx="7837714" cy="4406562"/>
+            <a:off x="275771" y="1874018"/>
+            <a:ext cx="8464596" cy="4759011"/>
           </a:xfrm>
           <a:prstGeom prst="rect">
             <a:avLst/>

</xml_diff>